<commit_message>
adding slides to repo
</commit_message>
<xml_diff>
--- a/MLOps_Assingment1_Slides.pptx
+++ b/MLOps_Assingment1_Slides.pptx
@@ -11,30 +11,31 @@
   <p:sldIdLst>
     <p:sldId id="256" r:id="rId8"/>
     <p:sldId id="257" r:id="rId9"/>
+    <p:sldId id="258" r:id="rId10"/>
   </p:sldIdLst>
   <p:sldSz cy="5143500" cx="9144000"/>
   <p:notesSz cx="6858000" cy="9144000"/>
   <p:embeddedFontLst>
     <p:embeddedFont>
       <p:font typeface="Lato"/>
-      <p:regular r:id="rId10"/>
-      <p:bold r:id="rId11"/>
-      <p:italic r:id="rId12"/>
-      <p:boldItalic r:id="rId13"/>
+      <p:regular r:id="rId11"/>
+      <p:bold r:id="rId12"/>
+      <p:italic r:id="rId13"/>
+      <p:boldItalic r:id="rId14"/>
     </p:embeddedFont>
     <p:embeddedFont>
       <p:font typeface="Lato Light"/>
-      <p:regular r:id="rId14"/>
-      <p:bold r:id="rId15"/>
-      <p:italic r:id="rId16"/>
-      <p:boldItalic r:id="rId17"/>
+      <p:regular r:id="rId15"/>
+      <p:bold r:id="rId16"/>
+      <p:italic r:id="rId17"/>
+      <p:boldItalic r:id="rId18"/>
     </p:embeddedFont>
     <p:embeddedFont>
       <p:font typeface="Helvetica Neue"/>
-      <p:regular r:id="rId18"/>
-      <p:bold r:id="rId19"/>
-      <p:italic r:id="rId20"/>
-      <p:boldItalic r:id="rId21"/>
+      <p:regular r:id="rId19"/>
+      <p:bold r:id="rId20"/>
+      <p:italic r:id="rId21"/>
+      <p:boldItalic r:id="rId22"/>
     </p:embeddedFont>
   </p:embeddedFontLst>
   <p:defaultTextStyle>
@@ -730,7 +731,7 @@
       </p:grpSpPr>
       <p:sp>
         <p:nvSpPr>
-          <p:cNvPr id="251" name="Google Shape;251;g36c6b31bc22_0_408:notes"/>
+          <p:cNvPr id="251" name="Google Shape;251;g36c6b31bc22_0_621:notes"/>
           <p:cNvSpPr/>
           <p:nvPr>
             <p:ph idx="2" type="sldImg"/>
@@ -765,7 +766,7 @@
       </p:sp>
       <p:sp>
         <p:nvSpPr>
-          <p:cNvPr id="252" name="Google Shape;252;g36c6b31bc22_0_408:notes"/>
+          <p:cNvPr id="252" name="Google Shape;252;g36c6b31bc22_0_621:notes"/>
           <p:cNvSpPr txBox="1"/>
           <p:nvPr>
             <p:ph idx="1" type="body"/>
@@ -815,7 +816,7 @@
   <p:cSld>
     <p:spTree>
       <p:nvGrpSpPr>
-        <p:cNvPr id="259" name="Shape 259"/>
+        <p:cNvPr id="256" name="Shape 256"/>
         <p:cNvGrpSpPr/>
         <p:nvPr/>
       </p:nvGrpSpPr>
@@ -829,7 +830,7 @@
       </p:grpSpPr>
       <p:sp>
         <p:nvSpPr>
-          <p:cNvPr id="260" name="Google Shape;260;g36c6b31bc22_0_608:notes"/>
+          <p:cNvPr id="257" name="Google Shape;257;g36c6b31bc22_0_408:notes"/>
           <p:cNvSpPr/>
           <p:nvPr>
             <p:ph idx="2" type="sldImg"/>
@@ -864,7 +865,106 @@
       </p:sp>
       <p:sp>
         <p:nvSpPr>
-          <p:cNvPr id="261" name="Google Shape;261;g36c6b31bc22_0_608:notes"/>
+          <p:cNvPr id="258" name="Google Shape;258;g36c6b31bc22_0_408:notes"/>
+          <p:cNvSpPr txBox="1"/>
+          <p:nvPr>
+            <p:ph idx="1" type="body"/>
+          </p:nvPr>
+        </p:nvSpPr>
+        <p:spPr>
+          <a:xfrm>
+            <a:off x="685800" y="4343400"/>
+            <a:ext cx="5486400" cy="4114800"/>
+          </a:xfrm>
+          <a:prstGeom prst="rect">
+            <a:avLst/>
+          </a:prstGeom>
+        </p:spPr>
+        <p:txBody>
+          <a:bodyPr anchorCtr="0" anchor="t" bIns="91425" lIns="91425" spcFirstLastPara="1" rIns="91425" wrap="square" tIns="91425">
+            <a:noAutofit/>
+          </a:bodyPr>
+          <a:lstStyle/>
+          <a:p>
+            <a:pPr indent="0" lvl="0" marL="0" rtl="0" algn="l">
+              <a:spcBef>
+                <a:spcPts val="0"/>
+              </a:spcBef>
+              <a:spcAft>
+                <a:spcPts val="0"/>
+              </a:spcAft>
+              <a:buNone/>
+            </a:pPr>
+            <a:r>
+              <a:t/>
+            </a:r>
+            <a:endParaRPr/>
+          </a:p>
+        </p:txBody>
+      </p:sp>
+    </p:spTree>
+  </p:cSld>
+  <p:clrMapOvr>
+    <a:masterClrMapping/>
+  </p:clrMapOvr>
+</p:notes>
+</file>
+
+<file path=ppt/notesSlides/notesSlide3.xml><?xml version="1.0" encoding="utf-8"?>
+<p:notes xmlns:a="http://schemas.openxmlformats.org/drawingml/2006/main" xmlns:r="http://schemas.openxmlformats.org/officeDocument/2006/relationships" xmlns:mc="http://schemas.openxmlformats.org/markup-compatibility/2006" xmlns:mv="urn:schemas-microsoft-com:mac:vml" xmlns:p="http://schemas.openxmlformats.org/presentationml/2006/main" xmlns:c="http://schemas.openxmlformats.org/drawingml/2006/chart" xmlns:dgm="http://schemas.openxmlformats.org/drawingml/2006/diagram" xmlns:o="urn:schemas-microsoft-com:office:office" xmlns:v="urn:schemas-microsoft-com:vml" xmlns:pvml="urn:schemas-microsoft-com:office:powerpoint" xmlns:com="http://schemas.openxmlformats.org/drawingml/2006/compatibility" xmlns:p14="http://schemas.microsoft.com/office/powerpoint/2010/main" xmlns:p15="http://schemas.microsoft.com/office/powerpoint/2012/main" xmlns:ahyp="http://schemas.microsoft.com/office/drawing/2018/hyperlinkcolor" showMasterPhAnim="0" showMasterSp="0">
+  <p:cSld>
+    <p:spTree>
+      <p:nvGrpSpPr>
+        <p:cNvPr id="265" name="Shape 265"/>
+        <p:cNvGrpSpPr/>
+        <p:nvPr/>
+      </p:nvGrpSpPr>
+      <p:grpSpPr>
+        <a:xfrm>
+          <a:off x="0" y="0"/>
+          <a:ext cx="0" cy="0"/>
+          <a:chOff x="0" y="0"/>
+          <a:chExt cx="0" cy="0"/>
+        </a:xfrm>
+      </p:grpSpPr>
+      <p:sp>
+        <p:nvSpPr>
+          <p:cNvPr id="266" name="Google Shape;266;g36c6b31bc22_0_608:notes"/>
+          <p:cNvSpPr/>
+          <p:nvPr>
+            <p:ph idx="2" type="sldImg"/>
+          </p:nvPr>
+        </p:nvSpPr>
+        <p:spPr>
+          <a:xfrm>
+            <a:off x="381300" y="685800"/>
+            <a:ext cx="6096000" cy="3429000"/>
+          </a:xfrm>
+          <a:custGeom>
+            <a:rect b="b" l="l" r="r" t="t"/>
+            <a:pathLst>
+              <a:path extrusionOk="0" h="120000" w="120000">
+                <a:moveTo>
+                  <a:pt x="0" y="0"/>
+                </a:moveTo>
+                <a:lnTo>
+                  <a:pt x="120000" y="0"/>
+                </a:lnTo>
+                <a:lnTo>
+                  <a:pt x="120000" y="120000"/>
+                </a:lnTo>
+                <a:lnTo>
+                  <a:pt x="0" y="120000"/>
+                </a:lnTo>
+                <a:close/>
+              </a:path>
+            </a:pathLst>
+          </a:custGeom>
+        </p:spPr>
+      </p:sp>
+      <p:sp>
+        <p:nvSpPr>
+          <p:cNvPr id="267" name="Google Shape;267;g36c6b31bc22_0_608:notes"/>
           <p:cNvSpPr txBox="1"/>
           <p:nvPr>
             <p:ph idx="1" type="body"/>
@@ -23331,6 +23431,116 @@
         </p:nvSpPr>
         <p:spPr>
           <a:xfrm>
+            <a:off x="560850" y="445025"/>
+            <a:ext cx="8022300" cy="393600"/>
+          </a:xfrm>
+          <a:prstGeom prst="rect">
+            <a:avLst/>
+          </a:prstGeom>
+        </p:spPr>
+        <p:txBody>
+          <a:bodyPr anchorCtr="0" anchor="ctr" bIns="34275" lIns="0" spcFirstLastPara="1" rIns="0" wrap="square" tIns="34275">
+            <a:noAutofit/>
+          </a:bodyPr>
+          <a:lstStyle/>
+          <a:p>
+            <a:pPr indent="0" lvl="0" marL="0" rtl="0" algn="l">
+              <a:spcBef>
+                <a:spcPts val="0"/>
+              </a:spcBef>
+              <a:spcAft>
+                <a:spcPts val="0"/>
+              </a:spcAft>
+              <a:buNone/>
+            </a:pPr>
+            <a:r>
+              <a:rPr lang="en"/>
+              <a:t>Github Link</a:t>
+            </a:r>
+            <a:endParaRPr/>
+          </a:p>
+        </p:txBody>
+      </p:sp>
+      <p:sp>
+        <p:nvSpPr>
+          <p:cNvPr id="255" name="Google Shape;255;p40"/>
+          <p:cNvSpPr txBox="1"/>
+          <p:nvPr>
+            <p:ph idx="4" type="title"/>
+          </p:nvPr>
+        </p:nvSpPr>
+        <p:spPr>
+          <a:xfrm>
+            <a:off x="560850" y="1244850"/>
+            <a:ext cx="8022300" cy="510600"/>
+          </a:xfrm>
+          <a:prstGeom prst="rect">
+            <a:avLst/>
+          </a:prstGeom>
+        </p:spPr>
+        <p:txBody>
+          <a:bodyPr anchorCtr="0" anchor="b" bIns="34275" lIns="0" spcFirstLastPara="1" rIns="0" wrap="square" tIns="34275">
+            <a:noAutofit/>
+          </a:bodyPr>
+          <a:lstStyle/>
+          <a:p>
+            <a:pPr indent="0" lvl="0" marL="0" rtl="0" algn="l">
+              <a:spcBef>
+                <a:spcPts val="0"/>
+              </a:spcBef>
+              <a:spcAft>
+                <a:spcPts val="0"/>
+              </a:spcAft>
+              <a:buNone/>
+            </a:pPr>
+            <a:r>
+              <a:rPr lang="en" u="sng">
+                <a:solidFill>
+                  <a:schemeClr val="hlink"/>
+                </a:solidFill>
+                <a:hlinkClick r:id="rId3"/>
+              </a:rPr>
+              <a:t>https://github.com/dkilleen428/MLOps_Assigngment1-data-versioning-comparison</a:t>
+            </a:r>
+            <a:endParaRPr/>
+          </a:p>
+        </p:txBody>
+      </p:sp>
+    </p:spTree>
+  </p:cSld>
+  <p:clrMapOvr>
+    <a:masterClrMapping/>
+  </p:clrMapOvr>
+</p:sld>
+</file>
+
+<file path=ppt/slides/slide2.xml><?xml version="1.0" encoding="utf-8"?>
+<p:sld xmlns:a="http://schemas.openxmlformats.org/drawingml/2006/main" xmlns:r="http://schemas.openxmlformats.org/officeDocument/2006/relationships" xmlns:mc="http://schemas.openxmlformats.org/markup-compatibility/2006" xmlns:mv="urn:schemas-microsoft-com:mac:vml" xmlns:p="http://schemas.openxmlformats.org/presentationml/2006/main" xmlns:c="http://schemas.openxmlformats.org/drawingml/2006/chart" xmlns:dgm="http://schemas.openxmlformats.org/drawingml/2006/diagram" xmlns:o="urn:schemas-microsoft-com:office:office" xmlns:v="urn:schemas-microsoft-com:vml" xmlns:pvml="urn:schemas-microsoft-com:office:powerpoint" xmlns:com="http://schemas.openxmlformats.org/drawingml/2006/compatibility" xmlns:p14="http://schemas.microsoft.com/office/powerpoint/2010/main" xmlns:p15="http://schemas.microsoft.com/office/powerpoint/2012/main" xmlns:ahyp="http://schemas.microsoft.com/office/drawing/2018/hyperlinkcolor">
+  <p:cSld>
+    <p:spTree>
+      <p:nvGrpSpPr>
+        <p:cNvPr id="259" name="Shape 259"/>
+        <p:cNvGrpSpPr/>
+        <p:nvPr/>
+      </p:nvGrpSpPr>
+      <p:grpSpPr>
+        <a:xfrm>
+          <a:off x="0" y="0"/>
+          <a:ext cx="0" cy="0"/>
+          <a:chOff x="0" y="0"/>
+          <a:chExt cx="0" cy="0"/>
+        </a:xfrm>
+      </p:grpSpPr>
+      <p:sp>
+        <p:nvSpPr>
+          <p:cNvPr id="260" name="Google Shape;260;p41"/>
+          <p:cNvSpPr txBox="1"/>
+          <p:nvPr>
+            <p:ph type="title"/>
+          </p:nvPr>
+        </p:nvSpPr>
+        <p:spPr>
+          <a:xfrm>
             <a:off x="560850" y="66275"/>
             <a:ext cx="8022300" cy="772500"/>
           </a:xfrm>
@@ -23354,16 +23564,16 @@
               <a:buNone/>
             </a:pPr>
             <a:r>
-              <a:rPr lang="en"/>
-              <a:t>Model Performance Comparison – Non‑DP vs DP on Cleaned Dataset (v2)</a:t>
+              <a:rPr b="1" lang="en"/>
+              <a:t>Model Performance Comparison: Non‑DP vs DP </a:t>
             </a:r>
-            <a:endParaRPr/>
+            <a:endParaRPr b="1"/>
           </a:p>
         </p:txBody>
       </p:sp>
       <p:sp>
         <p:nvSpPr>
-          <p:cNvPr id="255" name="Google Shape;255;p40"/>
+          <p:cNvPr id="261" name="Google Shape;261;p41"/>
           <p:cNvSpPr txBox="1"/>
           <p:nvPr>
             <p:ph idx="12" type="sldNum"/>
@@ -23419,7 +23629,7 @@
       </p:sp>
       <p:sp>
         <p:nvSpPr>
-          <p:cNvPr id="256" name="Google Shape;256;p40"/>
+          <p:cNvPr id="262" name="Google Shape;262;p41"/>
           <p:cNvSpPr txBox="1"/>
           <p:nvPr/>
         </p:nvSpPr>
@@ -23452,14 +23662,14 @@
               <a:buNone/>
             </a:pPr>
             <a:r>
-              <a:rPr lang="en">
+              <a:rPr b="1" lang="en">
                 <a:solidFill>
                   <a:schemeClr val="accent1"/>
                 </a:solidFill>
               </a:rPr>
               <a:t>Setup:</a:t>
             </a:r>
-            <a:endParaRPr>
+            <a:endParaRPr b="1">
               <a:solidFill>
                 <a:schemeClr val="accent1"/>
               </a:solidFill>
@@ -23607,14 +23817,14 @@
               <a:buNone/>
             </a:pPr>
             <a:r>
-              <a:rPr lang="en">
+              <a:rPr b="1" lang="en">
                 <a:solidFill>
                   <a:schemeClr val="accent1"/>
                 </a:solidFill>
               </a:rPr>
               <a:t>Performance Metrics:</a:t>
             </a:r>
-            <a:endParaRPr>
+            <a:endParaRPr b="1">
               <a:solidFill>
                 <a:schemeClr val="accent1"/>
               </a:solidFill>
@@ -23795,7 +24005,7 @@
       </p:sp>
       <p:graphicFrame>
         <p:nvGraphicFramePr>
-          <p:cNvPr id="257" name="Google Shape;257;p40"/>
+          <p:cNvPr id="263" name="Google Shape;263;p41"/>
           <p:cNvGraphicFramePr/>
           <p:nvPr/>
         </p:nvGraphicFramePr>
@@ -23808,7 +24018,7 @@
             <a:tbl>
               <a:tblPr>
                 <a:noFill/>
-                <a:tableStyleId>{1D38E3B9-DDCA-4361-8388-1740B95CC555}</a:tableStyleId>
+                <a:tableStyleId>{A36B29FF-AA21-4422-963F-FCA9BACD5C18}</a:tableStyleId>
               </a:tblPr>
               <a:tblGrid>
                 <a:gridCol w="1520675"/>
@@ -24002,7 +24212,7 @@
                             <a:schemeClr val="dk2"/>
                           </a:solidFill>
                         </a:rPr>
-                        <a:t>120.</a:t>
+                        <a:t>150.</a:t>
                       </a:r>
                       <a:r>
                         <a:rPr lang="en" sz="1100">
@@ -24105,7 +24315,7 @@
                             <a:schemeClr val="dk2"/>
                           </a:solidFill>
                         </a:rPr>
-                        <a:t>168</a:t>
+                        <a:t>198</a:t>
                       </a:r>
                       <a:r>
                         <a:rPr lang="en" sz="1100">
@@ -24208,7 +24418,7 @@
                             <a:schemeClr val="dk2"/>
                           </a:solidFill>
                         </a:rPr>
-                        <a:t>0.64</a:t>
+                        <a:t>0.54</a:t>
                       </a:r>
                       <a:endParaRPr sz="1100">
                         <a:solidFill>
@@ -24226,14 +24436,14 @@
       </p:graphicFrame>
       <p:sp>
         <p:nvSpPr>
-          <p:cNvPr id="258" name="Google Shape;258;p40"/>
+          <p:cNvPr id="264" name="Google Shape;264;p41"/>
           <p:cNvSpPr txBox="1"/>
           <p:nvPr/>
         </p:nvSpPr>
         <p:spPr>
           <a:xfrm>
-            <a:off x="5634000" y="1186425"/>
-            <a:ext cx="3446700" cy="3656400"/>
+            <a:off x="5183275" y="1110225"/>
+            <a:ext cx="3897300" cy="3656400"/>
           </a:xfrm>
           <a:prstGeom prst="rect">
             <a:avLst/>
@@ -24259,14 +24469,14 @@
               <a:buNone/>
             </a:pPr>
             <a:r>
-              <a:rPr lang="en">
+              <a:rPr b="1" lang="en">
                 <a:solidFill>
                   <a:schemeClr val="accent1"/>
                 </a:solidFill>
               </a:rPr>
               <a:t>Privacy Guarantee (DP‑SGD):</a:t>
             </a:r>
-            <a:endParaRPr>
+            <a:endParaRPr b="1">
               <a:solidFill>
                 <a:schemeClr val="accent1"/>
               </a:solidFill>
@@ -24386,14 +24596,14 @@
               <a:buNone/>
             </a:pPr>
             <a:r>
-              <a:rPr lang="en">
+              <a:rPr b="1" lang="en">
                 <a:solidFill>
                   <a:schemeClr val="accent1"/>
                 </a:solidFill>
               </a:rPr>
               <a:t>Insights:</a:t>
             </a:r>
-            <a:endParaRPr>
+            <a:endParaRPr b="1">
               <a:solidFill>
                 <a:schemeClr val="accent1"/>
               </a:solidFill>
@@ -24414,14 +24624,38 @@
               <a:buChar char="●"/>
             </a:pPr>
             <a:r>
-              <a:rPr lang="en">
+              <a:rPr b="1" lang="en">
                 <a:solidFill>
                   <a:schemeClr val="dk2"/>
                 </a:solidFill>
               </a:rPr>
-              <a:t>The DP model nearly matches, and slightly improves on, the non‑DP baseline.</a:t>
+              <a:t>The DP Model is slight worse than the non-DP model which makes sense </a:t>
             </a:r>
-            <a:endParaRPr>
+            <a:r>
+              <a:rPr b="1" lang="en">
+                <a:solidFill>
+                  <a:schemeClr val="dk2"/>
+                </a:solidFill>
+              </a:rPr>
+              <a:t>because</a:t>
+            </a:r>
+            <a:r>
+              <a:rPr b="1" lang="en">
+                <a:solidFill>
+                  <a:schemeClr val="dk2"/>
+                </a:solidFill>
+              </a:rPr>
+              <a:t> we are adding noise to protect </a:t>
+            </a:r>
+            <a:r>
+              <a:rPr b="1" lang="en">
+                <a:solidFill>
+                  <a:schemeClr val="dk2"/>
+                </a:solidFill>
+              </a:rPr>
+              <a:t>privacy</a:t>
+            </a:r>
+            <a:endParaRPr b="1">
               <a:solidFill>
                 <a:schemeClr val="dk2"/>
               </a:solidFill>
@@ -24475,7 +24709,7 @@
                   <a:schemeClr val="dk2"/>
                 </a:solidFill>
               </a:rPr>
-              <a:t>Strong privacy (ε &lt; 1) achieved without noticeable utility loss</a:t>
+              <a:t>Strong privacy (ε &lt; 1) achieved without extremely noticeable utility loss</a:t>
             </a:r>
             <a:endParaRPr>
               <a:solidFill>
@@ -24664,12 +24898,12 @@
 </p:sld>
 </file>
 
-<file path=ppt/slides/slide2.xml><?xml version="1.0" encoding="utf-8"?>
+<file path=ppt/slides/slide3.xml><?xml version="1.0" encoding="utf-8"?>
 <p:sld xmlns:a="http://schemas.openxmlformats.org/drawingml/2006/main" xmlns:r="http://schemas.openxmlformats.org/officeDocument/2006/relationships" xmlns:mc="http://schemas.openxmlformats.org/markup-compatibility/2006" xmlns:mv="urn:schemas-microsoft-com:mac:vml" xmlns:p="http://schemas.openxmlformats.org/presentationml/2006/main" xmlns:c="http://schemas.openxmlformats.org/drawingml/2006/chart" xmlns:dgm="http://schemas.openxmlformats.org/drawingml/2006/diagram" xmlns:o="urn:schemas-microsoft-com:office:office" xmlns:v="urn:schemas-microsoft-com:vml" xmlns:pvml="urn:schemas-microsoft-com:office:powerpoint" xmlns:com="http://schemas.openxmlformats.org/drawingml/2006/compatibility" xmlns:p14="http://schemas.microsoft.com/office/powerpoint/2010/main" xmlns:p15="http://schemas.microsoft.com/office/powerpoint/2012/main" xmlns:ahyp="http://schemas.microsoft.com/office/drawing/2018/hyperlinkcolor">
   <p:cSld>
     <p:spTree>
       <p:nvGrpSpPr>
-        <p:cNvPr id="262" name="Shape 262"/>
+        <p:cNvPr id="268" name="Shape 268"/>
         <p:cNvGrpSpPr/>
         <p:nvPr/>
       </p:nvGrpSpPr>
@@ -24683,7 +24917,7 @@
       </p:grpSpPr>
       <p:sp>
         <p:nvSpPr>
-          <p:cNvPr id="263" name="Google Shape;263;p41"/>
+          <p:cNvPr id="269" name="Google Shape;269;p42"/>
           <p:cNvSpPr txBox="1"/>
           <p:nvPr>
             <p:ph type="title"/>
@@ -24723,7 +24957,7 @@
       </p:sp>
       <p:sp>
         <p:nvSpPr>
-          <p:cNvPr id="264" name="Google Shape;264;p41"/>
+          <p:cNvPr id="270" name="Google Shape;270;p42"/>
           <p:cNvSpPr txBox="1"/>
           <p:nvPr>
             <p:ph idx="12" type="sldNum"/>
@@ -24779,7 +25013,7 @@
       </p:sp>
       <p:sp>
         <p:nvSpPr>
-          <p:cNvPr id="265" name="Google Shape;265;p41"/>
+          <p:cNvPr id="271" name="Google Shape;271;p42"/>
           <p:cNvSpPr txBox="1"/>
           <p:nvPr/>
         </p:nvSpPr>
@@ -24889,7 +25123,7 @@
       </p:sp>
       <p:graphicFrame>
         <p:nvGraphicFramePr>
-          <p:cNvPr id="266" name="Google Shape;266;p41"/>
+          <p:cNvPr id="272" name="Google Shape;272;p42"/>
           <p:cNvGraphicFramePr/>
           <p:nvPr/>
         </p:nvGraphicFramePr>
@@ -24902,7 +25136,7 @@
             <a:tbl>
               <a:tblPr>
                 <a:noFill/>
-                <a:tableStyleId>{1D38E3B9-DDCA-4361-8388-1740B95CC555}</a:tableStyleId>
+                <a:tableStyleId>{A36B29FF-AA21-4422-963F-FCA9BACD5C18}</a:tableStyleId>
               </a:tblPr>
               <a:tblGrid>
                 <a:gridCol w="2439875"/>
@@ -25596,285 +25830,6 @@
 </file>
 
 <file path=ppt/theme/theme1.xml><?xml version="1.0" encoding="utf-8"?>
-<a:theme xmlns:a="http://schemas.openxmlformats.org/drawingml/2006/main" xmlns:r="http://schemas.openxmlformats.org/officeDocument/2006/relationships" name="UChicago">
-  <a:themeElements>
-    <a:clrScheme name="Custom 3">
-      <a:dk1>
-        <a:srgbClr val="000000"/>
-      </a:dk1>
-      <a:lt1>
-        <a:srgbClr val="FFFFFF"/>
-      </a:lt1>
-      <a:dk2>
-        <a:srgbClr val="737373"/>
-      </a:dk2>
-      <a:lt2>
-        <a:srgbClr val="D9D9D9"/>
-      </a:lt2>
-      <a:accent1>
-        <a:srgbClr val="800000"/>
-      </a:accent1>
-      <a:accent2>
-        <a:srgbClr val="D9D9D9"/>
-      </a:accent2>
-      <a:accent3>
-        <a:srgbClr val="A6A6A6"/>
-      </a:accent3>
-      <a:accent4>
-        <a:srgbClr val="EAAA00"/>
-      </a:accent4>
-      <a:accent5>
-        <a:srgbClr val="B36955"/>
-      </a:accent5>
-      <a:accent6>
-        <a:srgbClr val="002A3A"/>
-      </a:accent6>
-      <a:hlink>
-        <a:srgbClr val="800000"/>
-      </a:hlink>
-      <a:folHlink>
-        <a:srgbClr val="737373"/>
-      </a:folHlink>
-    </a:clrScheme>
-    <a:fontScheme name="Office">
-      <a:majorFont>
-        <a:latin typeface="Arial"/>
-        <a:ea typeface=""/>
-        <a:cs typeface=""/>
-        <a:font script="Jpan" typeface="ＭＳ Ｐゴシック"/>
-        <a:font script="Hang" typeface="맑은 고딕"/>
-        <a:font script="Hans" typeface="宋体"/>
-        <a:font script="Hant" typeface="新細明體"/>
-        <a:font script="Arab" typeface="Times New Roman"/>
-        <a:font script="Hebr" typeface="Times New Roman"/>
-        <a:font script="Thai" typeface="Angsana New"/>
-        <a:font script="Ethi" typeface="Nyala"/>
-        <a:font script="Beng" typeface="Vrinda"/>
-        <a:font script="Gujr" typeface="Shruti"/>
-        <a:font script="Khmr" typeface="MoolBoran"/>
-        <a:font script="Knda" typeface="Tunga"/>
-        <a:font script="Guru" typeface="Raavi"/>
-        <a:font script="Cans" typeface="Euphemia"/>
-        <a:font script="Cher" typeface="Plantagenet Cherokee"/>
-        <a:font script="Yiii" typeface="Microsoft Yi Baiti"/>
-        <a:font script="Tibt" typeface="Microsoft Himalaya"/>
-        <a:font script="Thaa" typeface="MV Boli"/>
-        <a:font script="Deva" typeface="Mangal"/>
-        <a:font script="Telu" typeface="Gautami"/>
-        <a:font script="Taml" typeface="Latha"/>
-        <a:font script="Syrc" typeface="Estrangelo Edessa"/>
-        <a:font script="Orya" typeface="Kalinga"/>
-        <a:font script="Mlym" typeface="Kartika"/>
-        <a:font script="Laoo" typeface="DokChampa"/>
-        <a:font script="Sinh" typeface="Iskoola Pota"/>
-        <a:font script="Mong" typeface="Mongolian Baiti"/>
-        <a:font script="Viet" typeface="Times New Roman"/>
-        <a:font script="Uigh" typeface="Microsoft Uighur"/>
-        <a:font script="Geor" typeface="Sylfaen"/>
-      </a:majorFont>
-      <a:minorFont>
-        <a:latin typeface="Arial"/>
-        <a:ea typeface=""/>
-        <a:cs typeface=""/>
-        <a:font script="Jpan" typeface="ＭＳ Ｐゴシック"/>
-        <a:font script="Hang" typeface="맑은 고딕"/>
-        <a:font script="Hans" typeface="宋体"/>
-        <a:font script="Hant" typeface="新細明體"/>
-        <a:font script="Arab" typeface="Arial"/>
-        <a:font script="Hebr" typeface="Arial"/>
-        <a:font script="Thai" typeface="Cordia New"/>
-        <a:font script="Ethi" typeface="Nyala"/>
-        <a:font script="Beng" typeface="Vrinda"/>
-        <a:font script="Gujr" typeface="Shruti"/>
-        <a:font script="Khmr" typeface="DaunPenh"/>
-        <a:font script="Knda" typeface="Tunga"/>
-        <a:font script="Guru" typeface="Raavi"/>
-        <a:font script="Cans" typeface="Euphemia"/>
-        <a:font script="Cher" typeface="Plantagenet Cherokee"/>
-        <a:font script="Yiii" typeface="Microsoft Yi Baiti"/>
-        <a:font script="Tibt" typeface="Microsoft Himalaya"/>
-        <a:font script="Thaa" typeface="MV Boli"/>
-        <a:font script="Deva" typeface="Mangal"/>
-        <a:font script="Telu" typeface="Gautami"/>
-        <a:font script="Taml" typeface="Latha"/>
-        <a:font script="Syrc" typeface="Estrangelo Edessa"/>
-        <a:font script="Orya" typeface="Kalinga"/>
-        <a:font script="Mlym" typeface="Kartika"/>
-        <a:font script="Laoo" typeface="DokChampa"/>
-        <a:font script="Sinh" typeface="Iskoola Pota"/>
-        <a:font script="Mong" typeface="Mongolian Baiti"/>
-        <a:font script="Viet" typeface="Arial"/>
-        <a:font script="Uigh" typeface="Microsoft Uighur"/>
-        <a:font script="Geor" typeface="Sylfaen"/>
-      </a:minorFont>
-    </a:fontScheme>
-    <a:fmtScheme name="Office">
-      <a:fillStyleLst>
-        <a:solidFill>
-          <a:schemeClr val="phClr"/>
-        </a:solidFill>
-        <a:gradFill rotWithShape="1">
-          <a:gsLst>
-            <a:gs pos="0">
-              <a:schemeClr val="phClr">
-                <a:tint val="50000"/>
-                <a:satMod val="300000"/>
-              </a:schemeClr>
-            </a:gs>
-            <a:gs pos="35000">
-              <a:schemeClr val="phClr">
-                <a:tint val="37000"/>
-                <a:satMod val="300000"/>
-              </a:schemeClr>
-            </a:gs>
-            <a:gs pos="100000">
-              <a:schemeClr val="phClr">
-                <a:tint val="15000"/>
-                <a:satMod val="350000"/>
-              </a:schemeClr>
-            </a:gs>
-          </a:gsLst>
-          <a:lin ang="16200000" scaled="1"/>
-        </a:gradFill>
-        <a:gradFill rotWithShape="1">
-          <a:gsLst>
-            <a:gs pos="0">
-              <a:schemeClr val="phClr">
-                <a:tint val="100000"/>
-                <a:shade val="100000"/>
-                <a:satMod val="130000"/>
-              </a:schemeClr>
-            </a:gs>
-            <a:gs pos="100000">
-              <a:schemeClr val="phClr">
-                <a:tint val="50000"/>
-                <a:shade val="100000"/>
-                <a:satMod val="350000"/>
-              </a:schemeClr>
-            </a:gs>
-          </a:gsLst>
-          <a:lin ang="16200000" scaled="0"/>
-        </a:gradFill>
-      </a:fillStyleLst>
-      <a:lnStyleLst>
-        <a:ln w="9525" cap="flat" cmpd="sng" algn="ctr">
-          <a:solidFill>
-            <a:schemeClr val="phClr">
-              <a:shade val="95000"/>
-              <a:satMod val="105000"/>
-            </a:schemeClr>
-          </a:solidFill>
-          <a:prstDash val="solid"/>
-        </a:ln>
-        <a:ln w="25400" cap="flat" cmpd="sng" algn="ctr">
-          <a:solidFill>
-            <a:schemeClr val="phClr"/>
-          </a:solidFill>
-          <a:prstDash val="solid"/>
-        </a:ln>
-        <a:ln w="38100" cap="flat" cmpd="sng" algn="ctr">
-          <a:solidFill>
-            <a:schemeClr val="phClr"/>
-          </a:solidFill>
-          <a:prstDash val="solid"/>
-        </a:ln>
-      </a:lnStyleLst>
-      <a:effectStyleLst>
-        <a:effectStyle>
-          <a:effectLst>
-            <a:outerShdw blurRad="40000" dist="20000" dir="5400000" rotWithShape="0">
-              <a:srgbClr val="000000">
-                <a:alpha val="38000"/>
-              </a:srgbClr>
-            </a:outerShdw>
-          </a:effectLst>
-        </a:effectStyle>
-        <a:effectStyle>
-          <a:effectLst>
-            <a:outerShdw blurRad="40000" dist="23000" dir="5400000" rotWithShape="0">
-              <a:srgbClr val="000000">
-                <a:alpha val="35000"/>
-              </a:srgbClr>
-            </a:outerShdw>
-          </a:effectLst>
-        </a:effectStyle>
-        <a:effectStyle>
-          <a:effectLst>
-            <a:outerShdw blurRad="40000" dist="23000" dir="5400000" rotWithShape="0">
-              <a:srgbClr val="000000">
-                <a:alpha val="35000"/>
-              </a:srgbClr>
-            </a:outerShdw>
-          </a:effectLst>
-          <a:scene3d>
-            <a:camera prst="orthographicFront">
-              <a:rot lat="0" lon="0" rev="0"/>
-            </a:camera>
-            <a:lightRig rig="threePt" dir="t">
-              <a:rot lat="0" lon="0" rev="1200000"/>
-            </a:lightRig>
-          </a:scene3d>
-          <a:sp3d>
-            <a:bevelT w="63500" h="25400"/>
-          </a:sp3d>
-        </a:effectStyle>
-      </a:effectStyleLst>
-      <a:bgFillStyleLst>
-        <a:solidFill>
-          <a:schemeClr val="phClr"/>
-        </a:solidFill>
-        <a:gradFill rotWithShape="1">
-          <a:gsLst>
-            <a:gs pos="0">
-              <a:schemeClr val="phClr">
-                <a:tint val="40000"/>
-                <a:satMod val="350000"/>
-              </a:schemeClr>
-            </a:gs>
-            <a:gs pos="40000">
-              <a:schemeClr val="phClr">
-                <a:tint val="45000"/>
-                <a:shade val="99000"/>
-                <a:satMod val="350000"/>
-              </a:schemeClr>
-            </a:gs>
-            <a:gs pos="100000">
-              <a:schemeClr val="phClr">
-                <a:shade val="20000"/>
-                <a:satMod val="255000"/>
-              </a:schemeClr>
-            </a:gs>
-          </a:gsLst>
-          <a:path path="circle">
-            <a:fillToRect l="50000" t="-80000" r="50000" b="180000"/>
-          </a:path>
-        </a:gradFill>
-        <a:gradFill rotWithShape="1">
-          <a:gsLst>
-            <a:gs pos="0">
-              <a:schemeClr val="phClr">
-                <a:tint val="80000"/>
-                <a:satMod val="300000"/>
-              </a:schemeClr>
-            </a:gs>
-            <a:gs pos="100000">
-              <a:schemeClr val="phClr">
-                <a:shade val="30000"/>
-                <a:satMod val="200000"/>
-              </a:schemeClr>
-            </a:gs>
-          </a:gsLst>
-          <a:path path="circle">
-            <a:fillToRect l="50000" t="50000" r="50000" b="50000"/>
-          </a:path>
-        </a:gradFill>
-      </a:bgFillStyleLst>
-    </a:fmtScheme>
-  </a:themeElements>
-</a:theme>
-</file>
-
-<file path=ppt/theme/theme2.xml><?xml version="1.0" encoding="utf-8"?>
 <a:theme xmlns:a="http://schemas.openxmlformats.org/drawingml/2006/main" xmlns:r="http://schemas.openxmlformats.org/officeDocument/2006/relationships" name="Simple Light">
   <a:themeElements>
     <a:clrScheme name="Simple Light">
@@ -26153,7 +26108,7 @@
 </a:theme>
 </file>
 
-<file path=ppt/theme/theme3.xml><?xml version="1.0" encoding="utf-8"?>
+<file path=ppt/theme/theme2.xml><?xml version="1.0" encoding="utf-8"?>
 <a:theme xmlns:a="http://schemas.openxmlformats.org/drawingml/2006/main" xmlns:r="http://schemas.openxmlformats.org/officeDocument/2006/relationships">
   <a:themeElements>
     <a:clrScheme name="Default">
@@ -26430,4 +26385,283 @@
     </a:fmtScheme>
   </a:themeElements>
 </a:theme>
+</file>
+
+<file path=ppt/theme/theme3.xml><?xml version="1.0" encoding="utf-8"?>
+<a:theme xmlns:a="http://schemas.openxmlformats.org/drawingml/2006/main" xmlns:r="http://schemas.openxmlformats.org/officeDocument/2006/relationships" name="UChicago">
+  <a:themeElements>
+    <a:clrScheme name="Custom 3">
+      <a:dk1>
+        <a:srgbClr val="000000"/>
+      </a:dk1>
+      <a:lt1>
+        <a:srgbClr val="FFFFFF"/>
+      </a:lt1>
+      <a:dk2>
+        <a:srgbClr val="737373"/>
+      </a:dk2>
+      <a:lt2>
+        <a:srgbClr val="D9D9D9"/>
+      </a:lt2>
+      <a:accent1>
+        <a:srgbClr val="800000"/>
+      </a:accent1>
+      <a:accent2>
+        <a:srgbClr val="D9D9D9"/>
+      </a:accent2>
+      <a:accent3>
+        <a:srgbClr val="A6A6A6"/>
+      </a:accent3>
+      <a:accent4>
+        <a:srgbClr val="EAAA00"/>
+      </a:accent4>
+      <a:accent5>
+        <a:srgbClr val="B36955"/>
+      </a:accent5>
+      <a:accent6>
+        <a:srgbClr val="002A3A"/>
+      </a:accent6>
+      <a:hlink>
+        <a:srgbClr val="800000"/>
+      </a:hlink>
+      <a:folHlink>
+        <a:srgbClr val="737373"/>
+      </a:folHlink>
+    </a:clrScheme>
+    <a:fontScheme name="Office">
+      <a:majorFont>
+        <a:latin typeface="Arial"/>
+        <a:ea typeface=""/>
+        <a:cs typeface=""/>
+        <a:font script="Jpan" typeface="ＭＳ Ｐゴシック"/>
+        <a:font script="Hang" typeface="맑은 고딕"/>
+        <a:font script="Hans" typeface="宋体"/>
+        <a:font script="Hant" typeface="新細明體"/>
+        <a:font script="Arab" typeface="Times New Roman"/>
+        <a:font script="Hebr" typeface="Times New Roman"/>
+        <a:font script="Thai" typeface="Angsana New"/>
+        <a:font script="Ethi" typeface="Nyala"/>
+        <a:font script="Beng" typeface="Vrinda"/>
+        <a:font script="Gujr" typeface="Shruti"/>
+        <a:font script="Khmr" typeface="MoolBoran"/>
+        <a:font script="Knda" typeface="Tunga"/>
+        <a:font script="Guru" typeface="Raavi"/>
+        <a:font script="Cans" typeface="Euphemia"/>
+        <a:font script="Cher" typeface="Plantagenet Cherokee"/>
+        <a:font script="Yiii" typeface="Microsoft Yi Baiti"/>
+        <a:font script="Tibt" typeface="Microsoft Himalaya"/>
+        <a:font script="Thaa" typeface="MV Boli"/>
+        <a:font script="Deva" typeface="Mangal"/>
+        <a:font script="Telu" typeface="Gautami"/>
+        <a:font script="Taml" typeface="Latha"/>
+        <a:font script="Syrc" typeface="Estrangelo Edessa"/>
+        <a:font script="Orya" typeface="Kalinga"/>
+        <a:font script="Mlym" typeface="Kartika"/>
+        <a:font script="Laoo" typeface="DokChampa"/>
+        <a:font script="Sinh" typeface="Iskoola Pota"/>
+        <a:font script="Mong" typeface="Mongolian Baiti"/>
+        <a:font script="Viet" typeface="Times New Roman"/>
+        <a:font script="Uigh" typeface="Microsoft Uighur"/>
+        <a:font script="Geor" typeface="Sylfaen"/>
+      </a:majorFont>
+      <a:minorFont>
+        <a:latin typeface="Arial"/>
+        <a:ea typeface=""/>
+        <a:cs typeface=""/>
+        <a:font script="Jpan" typeface="ＭＳ Ｐゴシック"/>
+        <a:font script="Hang" typeface="맑은 고딕"/>
+        <a:font script="Hans" typeface="宋体"/>
+        <a:font script="Hant" typeface="新細明體"/>
+        <a:font script="Arab" typeface="Arial"/>
+        <a:font script="Hebr" typeface="Arial"/>
+        <a:font script="Thai" typeface="Cordia New"/>
+        <a:font script="Ethi" typeface="Nyala"/>
+        <a:font script="Beng" typeface="Vrinda"/>
+        <a:font script="Gujr" typeface="Shruti"/>
+        <a:font script="Khmr" typeface="DaunPenh"/>
+        <a:font script="Knda" typeface="Tunga"/>
+        <a:font script="Guru" typeface="Raavi"/>
+        <a:font script="Cans" typeface="Euphemia"/>
+        <a:font script="Cher" typeface="Plantagenet Cherokee"/>
+        <a:font script="Yiii" typeface="Microsoft Yi Baiti"/>
+        <a:font script="Tibt" typeface="Microsoft Himalaya"/>
+        <a:font script="Thaa" typeface="MV Boli"/>
+        <a:font script="Deva" typeface="Mangal"/>
+        <a:font script="Telu" typeface="Gautami"/>
+        <a:font script="Taml" typeface="Latha"/>
+        <a:font script="Syrc" typeface="Estrangelo Edessa"/>
+        <a:font script="Orya" typeface="Kalinga"/>
+        <a:font script="Mlym" typeface="Kartika"/>
+        <a:font script="Laoo" typeface="DokChampa"/>
+        <a:font script="Sinh" typeface="Iskoola Pota"/>
+        <a:font script="Mong" typeface="Mongolian Baiti"/>
+        <a:font script="Viet" typeface="Arial"/>
+        <a:font script="Uigh" typeface="Microsoft Uighur"/>
+        <a:font script="Geor" typeface="Sylfaen"/>
+      </a:minorFont>
+    </a:fontScheme>
+    <a:fmtScheme name="Office">
+      <a:fillStyleLst>
+        <a:solidFill>
+          <a:schemeClr val="phClr"/>
+        </a:solidFill>
+        <a:gradFill rotWithShape="1">
+          <a:gsLst>
+            <a:gs pos="0">
+              <a:schemeClr val="phClr">
+                <a:tint val="50000"/>
+                <a:satMod val="300000"/>
+              </a:schemeClr>
+            </a:gs>
+            <a:gs pos="35000">
+              <a:schemeClr val="phClr">
+                <a:tint val="37000"/>
+                <a:satMod val="300000"/>
+              </a:schemeClr>
+            </a:gs>
+            <a:gs pos="100000">
+              <a:schemeClr val="phClr">
+                <a:tint val="15000"/>
+                <a:satMod val="350000"/>
+              </a:schemeClr>
+            </a:gs>
+          </a:gsLst>
+          <a:lin ang="16200000" scaled="1"/>
+        </a:gradFill>
+        <a:gradFill rotWithShape="1">
+          <a:gsLst>
+            <a:gs pos="0">
+              <a:schemeClr val="phClr">
+                <a:tint val="100000"/>
+                <a:shade val="100000"/>
+                <a:satMod val="130000"/>
+              </a:schemeClr>
+            </a:gs>
+            <a:gs pos="100000">
+              <a:schemeClr val="phClr">
+                <a:tint val="50000"/>
+                <a:shade val="100000"/>
+                <a:satMod val="350000"/>
+              </a:schemeClr>
+            </a:gs>
+          </a:gsLst>
+          <a:lin ang="16200000" scaled="0"/>
+        </a:gradFill>
+      </a:fillStyleLst>
+      <a:lnStyleLst>
+        <a:ln w="9525" cap="flat" cmpd="sng" algn="ctr">
+          <a:solidFill>
+            <a:schemeClr val="phClr">
+              <a:shade val="95000"/>
+              <a:satMod val="105000"/>
+            </a:schemeClr>
+          </a:solidFill>
+          <a:prstDash val="solid"/>
+        </a:ln>
+        <a:ln w="25400" cap="flat" cmpd="sng" algn="ctr">
+          <a:solidFill>
+            <a:schemeClr val="phClr"/>
+          </a:solidFill>
+          <a:prstDash val="solid"/>
+        </a:ln>
+        <a:ln w="38100" cap="flat" cmpd="sng" algn="ctr">
+          <a:solidFill>
+            <a:schemeClr val="phClr"/>
+          </a:solidFill>
+          <a:prstDash val="solid"/>
+        </a:ln>
+      </a:lnStyleLst>
+      <a:effectStyleLst>
+        <a:effectStyle>
+          <a:effectLst>
+            <a:outerShdw blurRad="40000" dist="20000" dir="5400000" rotWithShape="0">
+              <a:srgbClr val="000000">
+                <a:alpha val="38000"/>
+              </a:srgbClr>
+            </a:outerShdw>
+          </a:effectLst>
+        </a:effectStyle>
+        <a:effectStyle>
+          <a:effectLst>
+            <a:outerShdw blurRad="40000" dist="23000" dir="5400000" rotWithShape="0">
+              <a:srgbClr val="000000">
+                <a:alpha val="35000"/>
+              </a:srgbClr>
+            </a:outerShdw>
+          </a:effectLst>
+        </a:effectStyle>
+        <a:effectStyle>
+          <a:effectLst>
+            <a:outerShdw blurRad="40000" dist="23000" dir="5400000" rotWithShape="0">
+              <a:srgbClr val="000000">
+                <a:alpha val="35000"/>
+              </a:srgbClr>
+            </a:outerShdw>
+          </a:effectLst>
+          <a:scene3d>
+            <a:camera prst="orthographicFront">
+              <a:rot lat="0" lon="0" rev="0"/>
+            </a:camera>
+            <a:lightRig rig="threePt" dir="t">
+              <a:rot lat="0" lon="0" rev="1200000"/>
+            </a:lightRig>
+          </a:scene3d>
+          <a:sp3d>
+            <a:bevelT w="63500" h="25400"/>
+          </a:sp3d>
+        </a:effectStyle>
+      </a:effectStyleLst>
+      <a:bgFillStyleLst>
+        <a:solidFill>
+          <a:schemeClr val="phClr"/>
+        </a:solidFill>
+        <a:gradFill rotWithShape="1">
+          <a:gsLst>
+            <a:gs pos="0">
+              <a:schemeClr val="phClr">
+                <a:tint val="40000"/>
+                <a:satMod val="350000"/>
+              </a:schemeClr>
+            </a:gs>
+            <a:gs pos="40000">
+              <a:schemeClr val="phClr">
+                <a:tint val="45000"/>
+                <a:shade val="99000"/>
+                <a:satMod val="350000"/>
+              </a:schemeClr>
+            </a:gs>
+            <a:gs pos="100000">
+              <a:schemeClr val="phClr">
+                <a:shade val="20000"/>
+                <a:satMod val="255000"/>
+              </a:schemeClr>
+            </a:gs>
+          </a:gsLst>
+          <a:path path="circle">
+            <a:fillToRect l="50000" t="-80000" r="50000" b="180000"/>
+          </a:path>
+        </a:gradFill>
+        <a:gradFill rotWithShape="1">
+          <a:gsLst>
+            <a:gs pos="0">
+              <a:schemeClr val="phClr">
+                <a:tint val="80000"/>
+                <a:satMod val="300000"/>
+              </a:schemeClr>
+            </a:gs>
+            <a:gs pos="100000">
+              <a:schemeClr val="phClr">
+                <a:shade val="30000"/>
+                <a:satMod val="200000"/>
+              </a:schemeClr>
+            </a:gs>
+          </a:gsLst>
+          <a:path path="circle">
+            <a:fillToRect l="50000" t="50000" r="50000" b="50000"/>
+          </a:path>
+        </a:gradFill>
+      </a:bgFillStyleLst>
+    </a:fmtScheme>
+  </a:themeElements>
+</a:theme>
 </file>
</xml_diff>